<commit_message>
Start creating powerpoint slides
</commit_message>
<xml_diff>
--- a/docs/SICAS_2017/Drop-InReportingWithGroovy.pptx
+++ b/docs/SICAS_2017/Drop-InReportingWithGroovy.pptx
@@ -5,21 +5,25 @@
     <p:sldMasterId id="2147483884" r:id="rId2"/>
   </p:sldMasterIdLst>
   <p:notesMasterIdLst>
-    <p:notesMasterId r:id="rId7"/>
+    <p:notesMasterId r:id="rId11"/>
   </p:notesMasterIdLst>
   <p:handoutMasterIdLst>
-    <p:handoutMasterId r:id="rId8"/>
+    <p:handoutMasterId r:id="rId12"/>
   </p:handoutMasterIdLst>
   <p:sldIdLst>
     <p:sldId id="265" r:id="rId3"/>
     <p:sldId id="310" r:id="rId4"/>
     <p:sldId id="315" r:id="rId5"/>
     <p:sldId id="314" r:id="rId6"/>
+    <p:sldId id="316" r:id="rId7"/>
+    <p:sldId id="317" r:id="rId8"/>
+    <p:sldId id="318" r:id="rId9"/>
+    <p:sldId id="319" r:id="rId10"/>
   </p:sldIdLst>
   <p:sldSz cx="9144000" cy="6858000" type="screen4x3"/>
   <p:notesSz cx="6858000" cy="9144000"/>
   <p:custDataLst>
-    <p:tags r:id="rId9"/>
+    <p:tags r:id="rId13"/>
   </p:custDataLst>
   <p:defaultTextStyle>
     <a:defPPr>
@@ -220,7 +224,7 @@
           <a:p>
             <a:fld id="{59088EAF-6ECA-4616-85EF-35AA19C641F3}" type="datetimeFigureOut">
               <a:rPr lang="en-US"/>
-              <a:t>8/10/2017</a:t>
+              <a:t>8/25/2017</a:t>
             </a:fld>
             <a:endParaRPr/>
           </a:p>
@@ -385,7 +389,7 @@
           <a:p>
             <a:fld id="{3ABD2D7A-D230-4F91-BD59-0A39C2703BA8}" type="datetimeFigureOut">
               <a:rPr lang="en-US"/>
-              <a:t>8/10/2017</a:t>
+              <a:t>8/25/2017</a:t>
             </a:fld>
             <a:endParaRPr/>
           </a:p>
@@ -879,7 +883,7 @@
             <a:fld id="{B61BEF0D-F0BB-DE4B-95CE-6DB70DBA9567}" type="datetimeFigureOut">
               <a:rPr lang="en-US" smtClean="0"/>
               <a:pPr/>
-              <a:t>8/10/2017</a:t>
+              <a:t>8/25/2017</a:t>
             </a:fld>
             <a:endParaRPr lang="en-US" dirty="0"/>
           </a:p>
@@ -1107,7 +1111,7 @@
           <a:p>
             <a:fld id="{03F41C87-7AD9-4845-A077-840E4A0F3F06}" type="datetimeFigureOut">
               <a:rPr lang="en-US" smtClean="0"/>
-              <a:t>8/10/2017</a:t>
+              <a:t>8/25/2017</a:t>
             </a:fld>
             <a:endParaRPr lang="en-US"/>
           </a:p>
@@ -1382,7 +1386,7 @@
           <a:p>
             <a:fld id="{03F41C87-7AD9-4845-A077-840E4A0F3F06}" type="datetimeFigureOut">
               <a:rPr lang="en-US" smtClean="0"/>
-              <a:t>8/10/2017</a:t>
+              <a:t>8/25/2017</a:t>
             </a:fld>
             <a:endParaRPr lang="en-US"/>
           </a:p>
@@ -1571,7 +1575,7 @@
           <a:p>
             <a:fld id="{03F41C87-7AD9-4845-A077-840E4A0F3F06}" type="datetimeFigureOut">
               <a:rPr lang="en-US" smtClean="0"/>
-              <a:t>8/10/2017</a:t>
+              <a:t>8/25/2017</a:t>
             </a:fld>
             <a:endParaRPr lang="en-US"/>
           </a:p>
@@ -1933,7 +1937,7 @@
           <a:p>
             <a:fld id="{03F41C87-7AD9-4845-A077-840E4A0F3F06}" type="datetimeFigureOut">
               <a:rPr lang="en-US" smtClean="0"/>
-              <a:t>8/10/2017</a:t>
+              <a:t>8/25/2017</a:t>
             </a:fld>
             <a:endParaRPr lang="en-US"/>
           </a:p>
@@ -2227,7 +2231,7 @@
           <a:p>
             <a:fld id="{03F41C87-7AD9-4845-A077-840E4A0F3F06}" type="datetimeFigureOut">
               <a:rPr lang="en-US" smtClean="0"/>
-              <a:t>8/10/2017</a:t>
+              <a:t>8/25/2017</a:t>
             </a:fld>
             <a:endParaRPr lang="en-US"/>
           </a:p>
@@ -2630,7 +2634,7 @@
           <a:p>
             <a:fld id="{03F41C87-7AD9-4845-A077-840E4A0F3F06}" type="datetimeFigureOut">
               <a:rPr lang="en-US" smtClean="0"/>
-              <a:t>8/10/2017</a:t>
+              <a:t>8/25/2017</a:t>
             </a:fld>
             <a:endParaRPr lang="en-US"/>
           </a:p>
@@ -2772,7 +2776,7 @@
           <a:p>
             <a:fld id="{03F41C87-7AD9-4845-A077-840E4A0F3F06}" type="datetimeFigureOut">
               <a:rPr lang="en-US" smtClean="0"/>
-              <a:t>8/10/2017</a:t>
+              <a:t>8/25/2017</a:t>
             </a:fld>
             <a:endParaRPr lang="en-US"/>
           </a:p>
@@ -2962,7 +2966,7 @@
           <a:p>
             <a:fld id="{03F41C87-7AD9-4845-A077-840E4A0F3F06}" type="datetimeFigureOut">
               <a:rPr lang="en-US" smtClean="0"/>
-              <a:t>8/10/2017</a:t>
+              <a:t>8/25/2017</a:t>
             </a:fld>
             <a:endParaRPr lang="en-US"/>
           </a:p>
@@ -3335,7 +3339,7 @@
           <a:p>
             <a:fld id="{03F41C87-7AD9-4845-A077-840E4A0F3F06}" type="datetimeFigureOut">
               <a:rPr lang="en-US" smtClean="0"/>
-              <a:t>8/10/2017</a:t>
+              <a:t>8/25/2017</a:t>
             </a:fld>
             <a:endParaRPr lang="en-US"/>
           </a:p>
@@ -3737,7 +3741,7 @@
             <a:fld id="{03F41C87-7AD9-4845-A077-840E4A0F3F06}" type="datetimeFigureOut">
               <a:rPr lang="en-US" smtClean="0"/>
               <a:pPr/>
-              <a:t>8/10/2017</a:t>
+              <a:t>8/25/2017</a:t>
             </a:fld>
             <a:endParaRPr lang="en-US"/>
           </a:p>
@@ -4045,7 +4049,7 @@
             <a:fld id="{03F41C87-7AD9-4845-A077-840E4A0F3F06}" type="datetimeFigureOut">
               <a:rPr lang="en-US" smtClean="0"/>
               <a:pPr/>
-              <a:t>8/10/2017</a:t>
+              <a:t>8/25/2017</a:t>
             </a:fld>
             <a:endParaRPr lang="en-US"/>
           </a:p>
@@ -5340,7 +5344,11 @@
             </a:pPr>
             <a:r>
               <a:rPr lang="en-US" dirty="0" smtClean="0"/>
-              <a:t>Edward Cole</a:t>
+              <a:t>Edward </a:t>
+            </a:r>
+            <a:r>
+              <a:rPr lang="en-US" dirty="0" smtClean="0"/>
+              <a:t>Cole – Senior Programmer/Analyst</a:t>
             </a:r>
             <a:endParaRPr lang="en-US" dirty="0"/>
           </a:p>
@@ -5852,6 +5860,1372 @@
     <p:extLst>
       <p:ext uri="{BB962C8B-B14F-4D97-AF65-F5344CB8AC3E}">
         <p14:creationId xmlns:p14="http://schemas.microsoft.com/office/powerpoint/2010/main" val="2478160142"/>
+      </p:ext>
+    </p:extLst>
+  </p:cSld>
+  <p:clrMapOvr>
+    <a:masterClrMapping/>
+  </p:clrMapOvr>
+  <mc:AlternateContent xmlns:mc="http://schemas.openxmlformats.org/markup-compatibility/2006" xmlns:p14="http://schemas.microsoft.com/office/powerpoint/2010/main">
+    <mc:Choice Requires="p14">
+      <p:transition spd="med" p14:dur="700">
+        <p:fade/>
+      </p:transition>
+    </mc:Choice>
+    <mc:Fallback xmlns="">
+      <p:transition spd="med">
+        <p:fade/>
+      </p:transition>
+    </mc:Fallback>
+  </mc:AlternateContent>
+  <p:timing>
+    <p:tnLst>
+      <p:par>
+        <p:cTn id="1" dur="indefinite" restart="never" nodeType="tmRoot"/>
+      </p:par>
+    </p:tnLst>
+  </p:timing>
+</p:sld>
+</file>
+
+<file path=ppt/slides/slide5.xml><?xml version="1.0" encoding="utf-8"?>
+<p:sld xmlns:a="http://schemas.openxmlformats.org/drawingml/2006/main" xmlns:r="http://schemas.openxmlformats.org/officeDocument/2006/relationships" xmlns:p="http://schemas.openxmlformats.org/presentationml/2006/main">
+  <p:cSld>
+    <p:spTree>
+      <p:nvGrpSpPr>
+        <p:cNvPr id="1" name=""/>
+        <p:cNvGrpSpPr/>
+        <p:nvPr/>
+      </p:nvGrpSpPr>
+      <p:grpSpPr>
+        <a:xfrm>
+          <a:off x="0" y="0"/>
+          <a:ext cx="0" cy="0"/>
+          <a:chOff x="0" y="0"/>
+          <a:chExt cx="0" cy="0"/>
+        </a:xfrm>
+      </p:grpSpPr>
+      <p:sp>
+        <p:nvSpPr>
+          <p:cNvPr id="2" name="Title 1"/>
+          <p:cNvSpPr>
+            <a:spLocks noGrp="1"/>
+          </p:cNvSpPr>
+          <p:nvPr>
+            <p:ph type="title"/>
+          </p:nvPr>
+        </p:nvSpPr>
+        <p:spPr/>
+        <p:txBody>
+          <a:bodyPr>
+            <a:normAutofit/>
+          </a:bodyPr>
+          <a:lstStyle/>
+          <a:p>
+            <a:r>
+              <a:rPr lang="en-US" sz="4800" dirty="0" smtClean="0">
+                <a:solidFill>
+                  <a:schemeClr val="accent1">
+                    <a:lumMod val="75000"/>
+                  </a:schemeClr>
+                </a:solidFill>
+              </a:rPr>
+              <a:t>A Real Solution to a Real Problem</a:t>
+            </a:r>
+            <a:endParaRPr lang="en-US" sz="4800" dirty="0">
+              <a:solidFill>
+                <a:schemeClr val="accent1">
+                  <a:lumMod val="75000"/>
+                </a:schemeClr>
+              </a:solidFill>
+            </a:endParaRPr>
+          </a:p>
+        </p:txBody>
+      </p:sp>
+      <p:sp>
+        <p:nvSpPr>
+          <p:cNvPr id="3" name="Text Placeholder 2"/>
+          <p:cNvSpPr>
+            <a:spLocks noGrp="1"/>
+          </p:cNvSpPr>
+          <p:nvPr>
+            <p:ph idx="1"/>
+          </p:nvPr>
+        </p:nvSpPr>
+        <p:spPr/>
+        <p:txBody>
+          <a:bodyPr>
+            <a:normAutofit/>
+          </a:bodyPr>
+          <a:lstStyle/>
+          <a:p>
+            <a:pPr marL="198935" indent="-198935">
+              <a:lnSpc>
+                <a:spcPct val="100000"/>
+              </a:lnSpc>
+              <a:buFont typeface="Wingdings 2"/>
+              <a:buChar char=""/>
+              <a:defRPr/>
+            </a:pPr>
+            <a:r>
+              <a:rPr lang="en-US" dirty="0" smtClean="0"/>
+              <a:t>Oracle Reports is Going Away.</a:t>
+            </a:r>
+          </a:p>
+          <a:p>
+            <a:pPr marL="491543" lvl="1" indent="-198935">
+              <a:lnSpc>
+                <a:spcPct val="100000"/>
+              </a:lnSpc>
+              <a:buFont typeface="Wingdings 2"/>
+              <a:buChar char=""/>
+              <a:defRPr/>
+            </a:pPr>
+            <a:r>
+              <a:rPr lang="en-US" dirty="0" smtClean="0"/>
+              <a:t>Oracle has been giving gentle hints for some time that we shoul</a:t>
+            </a:r>
+            <a:r>
+              <a:rPr lang="en-US" dirty="0" smtClean="0"/>
+              <a:t>d move on to another tool.</a:t>
+            </a:r>
+            <a:endParaRPr lang="en-US" dirty="0" smtClean="0"/>
+          </a:p>
+          <a:p>
+            <a:pPr marL="491543" lvl="1" indent="-198935">
+              <a:lnSpc>
+                <a:spcPct val="100000"/>
+              </a:lnSpc>
+              <a:buFont typeface="Wingdings 2"/>
+              <a:buChar char=""/>
+              <a:defRPr/>
+            </a:pPr>
+            <a:endParaRPr lang="en-US" dirty="0" smtClean="0"/>
+          </a:p>
+          <a:p>
+            <a:pPr marL="491543" lvl="1" indent="-198935">
+              <a:lnSpc>
+                <a:spcPct val="100000"/>
+              </a:lnSpc>
+              <a:buFont typeface="Wingdings 2"/>
+              <a:buChar char=""/>
+              <a:defRPr/>
+            </a:pPr>
+            <a:r>
+              <a:rPr lang="en-US" dirty="0" smtClean="0"/>
+              <a:t>We’ve </a:t>
+            </a:r>
+            <a:r>
+              <a:rPr lang="en-US" dirty="0"/>
+              <a:t>used Oracle Reports as our primary reporting tool since we started using Oracle, almost 25 years ago</a:t>
+            </a:r>
+            <a:r>
+              <a:rPr lang="en-US" dirty="0" smtClean="0"/>
+              <a:t>.</a:t>
+            </a:r>
+          </a:p>
+          <a:p>
+            <a:pPr marL="491543" lvl="1" indent="-198935">
+              <a:lnSpc>
+                <a:spcPct val="100000"/>
+              </a:lnSpc>
+              <a:buFont typeface="Wingdings 2"/>
+              <a:buChar char=""/>
+              <a:defRPr/>
+            </a:pPr>
+            <a:endParaRPr lang="en-US" dirty="0"/>
+          </a:p>
+          <a:p>
+            <a:pPr marL="491543" lvl="1" indent="-198935">
+              <a:lnSpc>
+                <a:spcPct val="100000"/>
+              </a:lnSpc>
+              <a:buFont typeface="Wingdings 2"/>
+              <a:buChar char=""/>
+              <a:defRPr/>
+            </a:pPr>
+            <a:r>
+              <a:rPr lang="en-US" dirty="0"/>
+              <a:t>We created over 600 Oracle Reports applications in the 15 years we’ve been using Banner</a:t>
+            </a:r>
+          </a:p>
+          <a:p>
+            <a:pPr marL="491543" lvl="1" indent="-198935">
+              <a:lnSpc>
+                <a:spcPct val="100000"/>
+              </a:lnSpc>
+              <a:buFont typeface="Wingdings 2"/>
+              <a:buChar char=""/>
+              <a:defRPr/>
+            </a:pPr>
+            <a:endParaRPr lang="en-US" dirty="0" smtClean="0"/>
+          </a:p>
+          <a:p>
+            <a:pPr marL="491543" lvl="1" indent="-198935">
+              <a:lnSpc>
+                <a:spcPct val="100000"/>
+              </a:lnSpc>
+              <a:buFont typeface="Wingdings 2"/>
+              <a:buChar char=""/>
+              <a:defRPr/>
+            </a:pPr>
+            <a:r>
+              <a:rPr lang="en-US" dirty="0" smtClean="0"/>
+              <a:t>It never did a good job of producing data extracts, which many of our users prefer to a printed report these days.</a:t>
+            </a:r>
+            <a:endParaRPr lang="en-US" dirty="0"/>
+          </a:p>
+          <a:p>
+            <a:endParaRPr lang="en-US" dirty="0"/>
+          </a:p>
+        </p:txBody>
+      </p:sp>
+      <p:sp>
+        <p:nvSpPr>
+          <p:cNvPr id="7" name="TextBox 3"/>
+          <p:cNvSpPr txBox="1">
+            <a:spLocks noChangeArrowheads="1"/>
+          </p:cNvSpPr>
+          <p:nvPr/>
+        </p:nvSpPr>
+        <p:spPr bwMode="auto">
+          <a:xfrm>
+            <a:off x="6159883" y="6477000"/>
+            <a:ext cx="2858244" cy="300082"/>
+          </a:xfrm>
+          <a:prstGeom prst="rect">
+            <a:avLst/>
+          </a:prstGeom>
+          <a:noFill/>
+          <a:ln>
+            <a:noFill/>
+          </a:ln>
+          <a:extLst>
+            <a:ext uri="{909E8E84-426E-40DD-AFC4-6F175D3DCCD1}">
+              <a14:hiddenFill xmlns:a14="http://schemas.microsoft.com/office/drawing/2010/main">
+                <a:solidFill>
+                  <a:srgbClr val="FFFFFF"/>
+                </a:solidFill>
+              </a14:hiddenFill>
+            </a:ext>
+            <a:ext uri="{91240B29-F687-4F45-9708-019B960494DF}">
+              <a14:hiddenLine xmlns:a14="http://schemas.microsoft.com/office/drawing/2010/main" w="9525">
+                <a:solidFill>
+                  <a:srgbClr val="000000"/>
+                </a:solidFill>
+                <a:miter lim="800000"/>
+                <a:headEnd/>
+                <a:tailEnd/>
+              </a14:hiddenLine>
+            </a:ext>
+          </a:extLst>
+        </p:spPr>
+        <p:txBody>
+          <a:bodyPr>
+            <a:spAutoFit/>
+          </a:bodyPr>
+          <a:lstStyle>
+            <a:lvl1pPr eaLnBrk="0" hangingPunct="0">
+              <a:defRPr>
+                <a:solidFill>
+                  <a:schemeClr val="tx1"/>
+                </a:solidFill>
+                <a:latin typeface="Arial" panose="020B0604020202020204" pitchFamily="34" charset="0"/>
+                <a:cs typeface="Arial" panose="020B0604020202020204" pitchFamily="34" charset="0"/>
+              </a:defRPr>
+            </a:lvl1pPr>
+            <a:lvl2pPr marL="742950" indent="-285750" eaLnBrk="0" hangingPunct="0">
+              <a:defRPr>
+                <a:solidFill>
+                  <a:schemeClr val="tx1"/>
+                </a:solidFill>
+                <a:latin typeface="Arial" panose="020B0604020202020204" pitchFamily="34" charset="0"/>
+                <a:cs typeface="Arial" panose="020B0604020202020204" pitchFamily="34" charset="0"/>
+              </a:defRPr>
+            </a:lvl2pPr>
+            <a:lvl3pPr marL="1143000" indent="-228600" eaLnBrk="0" hangingPunct="0">
+              <a:defRPr>
+                <a:solidFill>
+                  <a:schemeClr val="tx1"/>
+                </a:solidFill>
+                <a:latin typeface="Arial" panose="020B0604020202020204" pitchFamily="34" charset="0"/>
+                <a:cs typeface="Arial" panose="020B0604020202020204" pitchFamily="34" charset="0"/>
+              </a:defRPr>
+            </a:lvl3pPr>
+            <a:lvl4pPr marL="1600200" indent="-228600" eaLnBrk="0" hangingPunct="0">
+              <a:defRPr>
+                <a:solidFill>
+                  <a:schemeClr val="tx1"/>
+                </a:solidFill>
+                <a:latin typeface="Arial" panose="020B0604020202020204" pitchFamily="34" charset="0"/>
+                <a:cs typeface="Arial" panose="020B0604020202020204" pitchFamily="34" charset="0"/>
+              </a:defRPr>
+            </a:lvl4pPr>
+            <a:lvl5pPr marL="2057400" indent="-228600" eaLnBrk="0" hangingPunct="0">
+              <a:defRPr>
+                <a:solidFill>
+                  <a:schemeClr val="tx1"/>
+                </a:solidFill>
+                <a:latin typeface="Arial" panose="020B0604020202020204" pitchFamily="34" charset="0"/>
+                <a:cs typeface="Arial" panose="020B0604020202020204" pitchFamily="34" charset="0"/>
+              </a:defRPr>
+            </a:lvl5pPr>
+            <a:lvl6pPr marL="2514600" indent="-228600" eaLnBrk="0" fontAlgn="base" hangingPunct="0">
+              <a:spcBef>
+                <a:spcPct val="0"/>
+              </a:spcBef>
+              <a:spcAft>
+                <a:spcPct val="0"/>
+              </a:spcAft>
+              <a:defRPr>
+                <a:solidFill>
+                  <a:schemeClr val="tx1"/>
+                </a:solidFill>
+                <a:latin typeface="Arial" panose="020B0604020202020204" pitchFamily="34" charset="0"/>
+                <a:cs typeface="Arial" panose="020B0604020202020204" pitchFamily="34" charset="0"/>
+              </a:defRPr>
+            </a:lvl6pPr>
+            <a:lvl7pPr marL="2971800" indent="-228600" eaLnBrk="0" fontAlgn="base" hangingPunct="0">
+              <a:spcBef>
+                <a:spcPct val="0"/>
+              </a:spcBef>
+              <a:spcAft>
+                <a:spcPct val="0"/>
+              </a:spcAft>
+              <a:defRPr>
+                <a:solidFill>
+                  <a:schemeClr val="tx1"/>
+                </a:solidFill>
+                <a:latin typeface="Arial" panose="020B0604020202020204" pitchFamily="34" charset="0"/>
+                <a:cs typeface="Arial" panose="020B0604020202020204" pitchFamily="34" charset="0"/>
+              </a:defRPr>
+            </a:lvl7pPr>
+            <a:lvl8pPr marL="3429000" indent="-228600" eaLnBrk="0" fontAlgn="base" hangingPunct="0">
+              <a:spcBef>
+                <a:spcPct val="0"/>
+              </a:spcBef>
+              <a:spcAft>
+                <a:spcPct val="0"/>
+              </a:spcAft>
+              <a:defRPr>
+                <a:solidFill>
+                  <a:schemeClr val="tx1"/>
+                </a:solidFill>
+                <a:latin typeface="Arial" panose="020B0604020202020204" pitchFamily="34" charset="0"/>
+                <a:cs typeface="Arial" panose="020B0604020202020204" pitchFamily="34" charset="0"/>
+              </a:defRPr>
+            </a:lvl8pPr>
+            <a:lvl9pPr marL="3886200" indent="-228600" eaLnBrk="0" fontAlgn="base" hangingPunct="0">
+              <a:spcBef>
+                <a:spcPct val="0"/>
+              </a:spcBef>
+              <a:spcAft>
+                <a:spcPct val="0"/>
+              </a:spcAft>
+              <a:defRPr>
+                <a:solidFill>
+                  <a:schemeClr val="tx1"/>
+                </a:solidFill>
+                <a:latin typeface="Arial" panose="020B0604020202020204" pitchFamily="34" charset="0"/>
+                <a:cs typeface="Arial" panose="020B0604020202020204" pitchFamily="34" charset="0"/>
+              </a:defRPr>
+            </a:lvl9pPr>
+          </a:lstStyle>
+          <a:p>
+            <a:pPr algn="r" eaLnBrk="1" hangingPunct="1"/>
+            <a:r>
+              <a:rPr lang="en-US" altLang="en-US" sz="1350" dirty="0" smtClean="0"/>
+              <a:t>SICAS Summit 2017, </a:t>
+            </a:r>
+            <a:r>
+              <a:rPr lang="en-US" altLang="en-US" sz="1350" dirty="0"/>
+              <a:t>Villa Roma</a:t>
+            </a:r>
+          </a:p>
+        </p:txBody>
+      </p:sp>
+    </p:spTree>
+    <p:extLst>
+      <p:ext uri="{BB962C8B-B14F-4D97-AF65-F5344CB8AC3E}">
+        <p14:creationId xmlns:p14="http://schemas.microsoft.com/office/powerpoint/2010/main" val="3896415091"/>
+      </p:ext>
+    </p:extLst>
+  </p:cSld>
+  <p:clrMapOvr>
+    <a:masterClrMapping/>
+  </p:clrMapOvr>
+  <mc:AlternateContent xmlns:mc="http://schemas.openxmlformats.org/markup-compatibility/2006" xmlns:p14="http://schemas.microsoft.com/office/powerpoint/2010/main">
+    <mc:Choice Requires="p14">
+      <p:transition spd="med" p14:dur="700">
+        <p:fade/>
+      </p:transition>
+    </mc:Choice>
+    <mc:Fallback xmlns="">
+      <p:transition spd="med">
+        <p:fade/>
+      </p:transition>
+    </mc:Fallback>
+  </mc:AlternateContent>
+  <p:timing>
+    <p:tnLst>
+      <p:par>
+        <p:cTn id="1" dur="indefinite" restart="never" nodeType="tmRoot"/>
+      </p:par>
+    </p:tnLst>
+  </p:timing>
+</p:sld>
+</file>
+
+<file path=ppt/slides/slide6.xml><?xml version="1.0" encoding="utf-8"?>
+<p:sld xmlns:a="http://schemas.openxmlformats.org/drawingml/2006/main" xmlns:r="http://schemas.openxmlformats.org/officeDocument/2006/relationships" xmlns:p="http://schemas.openxmlformats.org/presentationml/2006/main">
+  <p:cSld>
+    <p:spTree>
+      <p:nvGrpSpPr>
+        <p:cNvPr id="1" name=""/>
+        <p:cNvGrpSpPr/>
+        <p:nvPr/>
+      </p:nvGrpSpPr>
+      <p:grpSpPr>
+        <a:xfrm>
+          <a:off x="0" y="0"/>
+          <a:ext cx="0" cy="0"/>
+          <a:chOff x="0" y="0"/>
+          <a:chExt cx="0" cy="0"/>
+        </a:xfrm>
+      </p:grpSpPr>
+      <p:sp>
+        <p:nvSpPr>
+          <p:cNvPr id="2" name="Title 1"/>
+          <p:cNvSpPr>
+            <a:spLocks noGrp="1"/>
+          </p:cNvSpPr>
+          <p:nvPr>
+            <p:ph type="title"/>
+          </p:nvPr>
+        </p:nvSpPr>
+        <p:spPr/>
+        <p:txBody>
+          <a:bodyPr>
+            <a:normAutofit/>
+          </a:bodyPr>
+          <a:lstStyle/>
+          <a:p>
+            <a:r>
+              <a:rPr lang="en-US" sz="4800" dirty="0">
+                <a:solidFill>
+                  <a:schemeClr val="accent1">
+                    <a:lumMod val="75000"/>
+                  </a:schemeClr>
+                </a:solidFill>
+              </a:rPr>
+              <a:t>Slide Heading Here</a:t>
+            </a:r>
+          </a:p>
+        </p:txBody>
+      </p:sp>
+      <p:sp>
+        <p:nvSpPr>
+          <p:cNvPr id="3" name="Text Placeholder 2"/>
+          <p:cNvSpPr>
+            <a:spLocks noGrp="1"/>
+          </p:cNvSpPr>
+          <p:nvPr>
+            <p:ph idx="1"/>
+          </p:nvPr>
+        </p:nvSpPr>
+        <p:spPr/>
+        <p:txBody>
+          <a:bodyPr/>
+          <a:lstStyle/>
+          <a:p>
+            <a:pPr marL="198935" indent="-198935">
+              <a:lnSpc>
+                <a:spcPct val="100000"/>
+              </a:lnSpc>
+              <a:buFont typeface="Wingdings 2"/>
+              <a:buChar char=""/>
+              <a:defRPr/>
+            </a:pPr>
+            <a:r>
+              <a:rPr lang="en-US" dirty="0"/>
+              <a:t>Presentation Text</a:t>
+            </a:r>
+          </a:p>
+          <a:p>
+            <a:pPr marL="377291" lvl="3" indent="-198935">
+              <a:lnSpc>
+                <a:spcPct val="100000"/>
+              </a:lnSpc>
+              <a:spcBef>
+                <a:spcPts val="173"/>
+              </a:spcBef>
+              <a:buSzPct val="80000"/>
+              <a:buFont typeface="Wingdings 2"/>
+              <a:buChar char=""/>
+              <a:defRPr/>
+            </a:pPr>
+            <a:r>
+              <a:rPr lang="en-US" sz="1500" dirty="0"/>
+              <a:t>Screen Captures</a:t>
+            </a:r>
+          </a:p>
+          <a:p>
+            <a:pPr marL="377291" lvl="3" indent="-198935">
+              <a:lnSpc>
+                <a:spcPct val="100000"/>
+              </a:lnSpc>
+              <a:spcBef>
+                <a:spcPts val="173"/>
+              </a:spcBef>
+              <a:buSzPct val="80000"/>
+              <a:buFont typeface="Wingdings 2"/>
+              <a:buChar char=""/>
+              <a:defRPr/>
+            </a:pPr>
+            <a:r>
+              <a:rPr lang="en-US" sz="1500" dirty="0"/>
+              <a:t>Etc.</a:t>
+            </a:r>
+          </a:p>
+          <a:p>
+            <a:pPr marL="198935" indent="-198935">
+              <a:lnSpc>
+                <a:spcPct val="100000"/>
+              </a:lnSpc>
+              <a:buFont typeface="Wingdings 2"/>
+              <a:buChar char=""/>
+              <a:defRPr/>
+            </a:pPr>
+            <a:r>
+              <a:rPr lang="en-US" dirty="0"/>
+              <a:t>Presenters – duplicate this slide as many times as needed</a:t>
+            </a:r>
+          </a:p>
+          <a:p>
+            <a:endParaRPr lang="en-US" dirty="0"/>
+          </a:p>
+        </p:txBody>
+      </p:sp>
+      <p:sp>
+        <p:nvSpPr>
+          <p:cNvPr id="7" name="TextBox 3"/>
+          <p:cNvSpPr txBox="1">
+            <a:spLocks noChangeArrowheads="1"/>
+          </p:cNvSpPr>
+          <p:nvPr/>
+        </p:nvSpPr>
+        <p:spPr bwMode="auto">
+          <a:xfrm>
+            <a:off x="6159883" y="6477000"/>
+            <a:ext cx="2858244" cy="300082"/>
+          </a:xfrm>
+          <a:prstGeom prst="rect">
+            <a:avLst/>
+          </a:prstGeom>
+          <a:noFill/>
+          <a:ln>
+            <a:noFill/>
+          </a:ln>
+          <a:extLst>
+            <a:ext uri="{909E8E84-426E-40DD-AFC4-6F175D3DCCD1}">
+              <a14:hiddenFill xmlns:a14="http://schemas.microsoft.com/office/drawing/2010/main">
+                <a:solidFill>
+                  <a:srgbClr val="FFFFFF"/>
+                </a:solidFill>
+              </a14:hiddenFill>
+            </a:ext>
+            <a:ext uri="{91240B29-F687-4F45-9708-019B960494DF}">
+              <a14:hiddenLine xmlns:a14="http://schemas.microsoft.com/office/drawing/2010/main" w="9525">
+                <a:solidFill>
+                  <a:srgbClr val="000000"/>
+                </a:solidFill>
+                <a:miter lim="800000"/>
+                <a:headEnd/>
+                <a:tailEnd/>
+              </a14:hiddenLine>
+            </a:ext>
+          </a:extLst>
+        </p:spPr>
+        <p:txBody>
+          <a:bodyPr>
+            <a:spAutoFit/>
+          </a:bodyPr>
+          <a:lstStyle>
+            <a:lvl1pPr eaLnBrk="0" hangingPunct="0">
+              <a:defRPr>
+                <a:solidFill>
+                  <a:schemeClr val="tx1"/>
+                </a:solidFill>
+                <a:latin typeface="Arial" panose="020B0604020202020204" pitchFamily="34" charset="0"/>
+                <a:cs typeface="Arial" panose="020B0604020202020204" pitchFamily="34" charset="0"/>
+              </a:defRPr>
+            </a:lvl1pPr>
+            <a:lvl2pPr marL="742950" indent="-285750" eaLnBrk="0" hangingPunct="0">
+              <a:defRPr>
+                <a:solidFill>
+                  <a:schemeClr val="tx1"/>
+                </a:solidFill>
+                <a:latin typeface="Arial" panose="020B0604020202020204" pitchFamily="34" charset="0"/>
+                <a:cs typeface="Arial" panose="020B0604020202020204" pitchFamily="34" charset="0"/>
+              </a:defRPr>
+            </a:lvl2pPr>
+            <a:lvl3pPr marL="1143000" indent="-228600" eaLnBrk="0" hangingPunct="0">
+              <a:defRPr>
+                <a:solidFill>
+                  <a:schemeClr val="tx1"/>
+                </a:solidFill>
+                <a:latin typeface="Arial" panose="020B0604020202020204" pitchFamily="34" charset="0"/>
+                <a:cs typeface="Arial" panose="020B0604020202020204" pitchFamily="34" charset="0"/>
+              </a:defRPr>
+            </a:lvl3pPr>
+            <a:lvl4pPr marL="1600200" indent="-228600" eaLnBrk="0" hangingPunct="0">
+              <a:defRPr>
+                <a:solidFill>
+                  <a:schemeClr val="tx1"/>
+                </a:solidFill>
+                <a:latin typeface="Arial" panose="020B0604020202020204" pitchFamily="34" charset="0"/>
+                <a:cs typeface="Arial" panose="020B0604020202020204" pitchFamily="34" charset="0"/>
+              </a:defRPr>
+            </a:lvl4pPr>
+            <a:lvl5pPr marL="2057400" indent="-228600" eaLnBrk="0" hangingPunct="0">
+              <a:defRPr>
+                <a:solidFill>
+                  <a:schemeClr val="tx1"/>
+                </a:solidFill>
+                <a:latin typeface="Arial" panose="020B0604020202020204" pitchFamily="34" charset="0"/>
+                <a:cs typeface="Arial" panose="020B0604020202020204" pitchFamily="34" charset="0"/>
+              </a:defRPr>
+            </a:lvl5pPr>
+            <a:lvl6pPr marL="2514600" indent="-228600" eaLnBrk="0" fontAlgn="base" hangingPunct="0">
+              <a:spcBef>
+                <a:spcPct val="0"/>
+              </a:spcBef>
+              <a:spcAft>
+                <a:spcPct val="0"/>
+              </a:spcAft>
+              <a:defRPr>
+                <a:solidFill>
+                  <a:schemeClr val="tx1"/>
+                </a:solidFill>
+                <a:latin typeface="Arial" panose="020B0604020202020204" pitchFamily="34" charset="0"/>
+                <a:cs typeface="Arial" panose="020B0604020202020204" pitchFamily="34" charset="0"/>
+              </a:defRPr>
+            </a:lvl6pPr>
+            <a:lvl7pPr marL="2971800" indent="-228600" eaLnBrk="0" fontAlgn="base" hangingPunct="0">
+              <a:spcBef>
+                <a:spcPct val="0"/>
+              </a:spcBef>
+              <a:spcAft>
+                <a:spcPct val="0"/>
+              </a:spcAft>
+              <a:defRPr>
+                <a:solidFill>
+                  <a:schemeClr val="tx1"/>
+                </a:solidFill>
+                <a:latin typeface="Arial" panose="020B0604020202020204" pitchFamily="34" charset="0"/>
+                <a:cs typeface="Arial" panose="020B0604020202020204" pitchFamily="34" charset="0"/>
+              </a:defRPr>
+            </a:lvl7pPr>
+            <a:lvl8pPr marL="3429000" indent="-228600" eaLnBrk="0" fontAlgn="base" hangingPunct="0">
+              <a:spcBef>
+                <a:spcPct val="0"/>
+              </a:spcBef>
+              <a:spcAft>
+                <a:spcPct val="0"/>
+              </a:spcAft>
+              <a:defRPr>
+                <a:solidFill>
+                  <a:schemeClr val="tx1"/>
+                </a:solidFill>
+                <a:latin typeface="Arial" panose="020B0604020202020204" pitchFamily="34" charset="0"/>
+                <a:cs typeface="Arial" panose="020B0604020202020204" pitchFamily="34" charset="0"/>
+              </a:defRPr>
+            </a:lvl8pPr>
+            <a:lvl9pPr marL="3886200" indent="-228600" eaLnBrk="0" fontAlgn="base" hangingPunct="0">
+              <a:spcBef>
+                <a:spcPct val="0"/>
+              </a:spcBef>
+              <a:spcAft>
+                <a:spcPct val="0"/>
+              </a:spcAft>
+              <a:defRPr>
+                <a:solidFill>
+                  <a:schemeClr val="tx1"/>
+                </a:solidFill>
+                <a:latin typeface="Arial" panose="020B0604020202020204" pitchFamily="34" charset="0"/>
+                <a:cs typeface="Arial" panose="020B0604020202020204" pitchFamily="34" charset="0"/>
+              </a:defRPr>
+            </a:lvl9pPr>
+          </a:lstStyle>
+          <a:p>
+            <a:pPr algn="r" eaLnBrk="1" hangingPunct="1"/>
+            <a:r>
+              <a:rPr lang="en-US" altLang="en-US" sz="1350" dirty="0" smtClean="0"/>
+              <a:t>SICAS Summit 2017, </a:t>
+            </a:r>
+            <a:r>
+              <a:rPr lang="en-US" altLang="en-US" sz="1350" dirty="0"/>
+              <a:t>Villa Roma</a:t>
+            </a:r>
+          </a:p>
+        </p:txBody>
+      </p:sp>
+    </p:spTree>
+    <p:extLst>
+      <p:ext uri="{BB962C8B-B14F-4D97-AF65-F5344CB8AC3E}">
+        <p14:creationId xmlns:p14="http://schemas.microsoft.com/office/powerpoint/2010/main" val="4136343241"/>
+      </p:ext>
+    </p:extLst>
+  </p:cSld>
+  <p:clrMapOvr>
+    <a:masterClrMapping/>
+  </p:clrMapOvr>
+  <mc:AlternateContent xmlns:mc="http://schemas.openxmlformats.org/markup-compatibility/2006" xmlns:p14="http://schemas.microsoft.com/office/powerpoint/2010/main">
+    <mc:Choice Requires="p14">
+      <p:transition spd="med" p14:dur="700">
+        <p:fade/>
+      </p:transition>
+    </mc:Choice>
+    <mc:Fallback xmlns="">
+      <p:transition spd="med">
+        <p:fade/>
+      </p:transition>
+    </mc:Fallback>
+  </mc:AlternateContent>
+  <p:timing>
+    <p:tnLst>
+      <p:par>
+        <p:cTn id="1" dur="indefinite" restart="never" nodeType="tmRoot"/>
+      </p:par>
+    </p:tnLst>
+  </p:timing>
+</p:sld>
+</file>
+
+<file path=ppt/slides/slide7.xml><?xml version="1.0" encoding="utf-8"?>
+<p:sld xmlns:a="http://schemas.openxmlformats.org/drawingml/2006/main" xmlns:r="http://schemas.openxmlformats.org/officeDocument/2006/relationships" xmlns:p="http://schemas.openxmlformats.org/presentationml/2006/main">
+  <p:cSld>
+    <p:spTree>
+      <p:nvGrpSpPr>
+        <p:cNvPr id="1" name=""/>
+        <p:cNvGrpSpPr/>
+        <p:nvPr/>
+      </p:nvGrpSpPr>
+      <p:grpSpPr>
+        <a:xfrm>
+          <a:off x="0" y="0"/>
+          <a:ext cx="0" cy="0"/>
+          <a:chOff x="0" y="0"/>
+          <a:chExt cx="0" cy="0"/>
+        </a:xfrm>
+      </p:grpSpPr>
+      <p:sp>
+        <p:nvSpPr>
+          <p:cNvPr id="2" name="Title 1"/>
+          <p:cNvSpPr>
+            <a:spLocks noGrp="1"/>
+          </p:cNvSpPr>
+          <p:nvPr>
+            <p:ph type="title"/>
+          </p:nvPr>
+        </p:nvSpPr>
+        <p:spPr/>
+        <p:txBody>
+          <a:bodyPr>
+            <a:normAutofit/>
+          </a:bodyPr>
+          <a:lstStyle/>
+          <a:p>
+            <a:r>
+              <a:rPr lang="en-US" sz="4800" dirty="0">
+                <a:solidFill>
+                  <a:schemeClr val="accent1">
+                    <a:lumMod val="75000"/>
+                  </a:schemeClr>
+                </a:solidFill>
+              </a:rPr>
+              <a:t>Slide Heading Here</a:t>
+            </a:r>
+          </a:p>
+        </p:txBody>
+      </p:sp>
+      <p:sp>
+        <p:nvSpPr>
+          <p:cNvPr id="3" name="Text Placeholder 2"/>
+          <p:cNvSpPr>
+            <a:spLocks noGrp="1"/>
+          </p:cNvSpPr>
+          <p:nvPr>
+            <p:ph idx="1"/>
+          </p:nvPr>
+        </p:nvSpPr>
+        <p:spPr/>
+        <p:txBody>
+          <a:bodyPr/>
+          <a:lstStyle/>
+          <a:p>
+            <a:pPr marL="198935" indent="-198935">
+              <a:lnSpc>
+                <a:spcPct val="100000"/>
+              </a:lnSpc>
+              <a:buFont typeface="Wingdings 2"/>
+              <a:buChar char=""/>
+              <a:defRPr/>
+            </a:pPr>
+            <a:r>
+              <a:rPr lang="en-US" dirty="0"/>
+              <a:t>Presentation Text</a:t>
+            </a:r>
+          </a:p>
+          <a:p>
+            <a:pPr marL="377291" lvl="3" indent="-198935">
+              <a:lnSpc>
+                <a:spcPct val="100000"/>
+              </a:lnSpc>
+              <a:spcBef>
+                <a:spcPts val="173"/>
+              </a:spcBef>
+              <a:buSzPct val="80000"/>
+              <a:buFont typeface="Wingdings 2"/>
+              <a:buChar char=""/>
+              <a:defRPr/>
+            </a:pPr>
+            <a:r>
+              <a:rPr lang="en-US" sz="1500" dirty="0"/>
+              <a:t>Screen Captures</a:t>
+            </a:r>
+          </a:p>
+          <a:p>
+            <a:pPr marL="377291" lvl="3" indent="-198935">
+              <a:lnSpc>
+                <a:spcPct val="100000"/>
+              </a:lnSpc>
+              <a:spcBef>
+                <a:spcPts val="173"/>
+              </a:spcBef>
+              <a:buSzPct val="80000"/>
+              <a:buFont typeface="Wingdings 2"/>
+              <a:buChar char=""/>
+              <a:defRPr/>
+            </a:pPr>
+            <a:r>
+              <a:rPr lang="en-US" sz="1500" dirty="0"/>
+              <a:t>Etc.</a:t>
+            </a:r>
+          </a:p>
+          <a:p>
+            <a:pPr marL="198935" indent="-198935">
+              <a:lnSpc>
+                <a:spcPct val="100000"/>
+              </a:lnSpc>
+              <a:buFont typeface="Wingdings 2"/>
+              <a:buChar char=""/>
+              <a:defRPr/>
+            </a:pPr>
+            <a:r>
+              <a:rPr lang="en-US" dirty="0"/>
+              <a:t>Presenters – duplicate this slide as many times as needed</a:t>
+            </a:r>
+          </a:p>
+          <a:p>
+            <a:endParaRPr lang="en-US" dirty="0"/>
+          </a:p>
+        </p:txBody>
+      </p:sp>
+      <p:sp>
+        <p:nvSpPr>
+          <p:cNvPr id="7" name="TextBox 3"/>
+          <p:cNvSpPr txBox="1">
+            <a:spLocks noChangeArrowheads="1"/>
+          </p:cNvSpPr>
+          <p:nvPr/>
+        </p:nvSpPr>
+        <p:spPr bwMode="auto">
+          <a:xfrm>
+            <a:off x="6159883" y="6477000"/>
+            <a:ext cx="2858244" cy="300082"/>
+          </a:xfrm>
+          <a:prstGeom prst="rect">
+            <a:avLst/>
+          </a:prstGeom>
+          <a:noFill/>
+          <a:ln>
+            <a:noFill/>
+          </a:ln>
+          <a:extLst>
+            <a:ext uri="{909E8E84-426E-40DD-AFC4-6F175D3DCCD1}">
+              <a14:hiddenFill xmlns:a14="http://schemas.microsoft.com/office/drawing/2010/main">
+                <a:solidFill>
+                  <a:srgbClr val="FFFFFF"/>
+                </a:solidFill>
+              </a14:hiddenFill>
+            </a:ext>
+            <a:ext uri="{91240B29-F687-4F45-9708-019B960494DF}">
+              <a14:hiddenLine xmlns:a14="http://schemas.microsoft.com/office/drawing/2010/main" w="9525">
+                <a:solidFill>
+                  <a:srgbClr val="000000"/>
+                </a:solidFill>
+                <a:miter lim="800000"/>
+                <a:headEnd/>
+                <a:tailEnd/>
+              </a14:hiddenLine>
+            </a:ext>
+          </a:extLst>
+        </p:spPr>
+        <p:txBody>
+          <a:bodyPr>
+            <a:spAutoFit/>
+          </a:bodyPr>
+          <a:lstStyle>
+            <a:lvl1pPr eaLnBrk="0" hangingPunct="0">
+              <a:defRPr>
+                <a:solidFill>
+                  <a:schemeClr val="tx1"/>
+                </a:solidFill>
+                <a:latin typeface="Arial" panose="020B0604020202020204" pitchFamily="34" charset="0"/>
+                <a:cs typeface="Arial" panose="020B0604020202020204" pitchFamily="34" charset="0"/>
+              </a:defRPr>
+            </a:lvl1pPr>
+            <a:lvl2pPr marL="742950" indent="-285750" eaLnBrk="0" hangingPunct="0">
+              <a:defRPr>
+                <a:solidFill>
+                  <a:schemeClr val="tx1"/>
+                </a:solidFill>
+                <a:latin typeface="Arial" panose="020B0604020202020204" pitchFamily="34" charset="0"/>
+                <a:cs typeface="Arial" panose="020B0604020202020204" pitchFamily="34" charset="0"/>
+              </a:defRPr>
+            </a:lvl2pPr>
+            <a:lvl3pPr marL="1143000" indent="-228600" eaLnBrk="0" hangingPunct="0">
+              <a:defRPr>
+                <a:solidFill>
+                  <a:schemeClr val="tx1"/>
+                </a:solidFill>
+                <a:latin typeface="Arial" panose="020B0604020202020204" pitchFamily="34" charset="0"/>
+                <a:cs typeface="Arial" panose="020B0604020202020204" pitchFamily="34" charset="0"/>
+              </a:defRPr>
+            </a:lvl3pPr>
+            <a:lvl4pPr marL="1600200" indent="-228600" eaLnBrk="0" hangingPunct="0">
+              <a:defRPr>
+                <a:solidFill>
+                  <a:schemeClr val="tx1"/>
+                </a:solidFill>
+                <a:latin typeface="Arial" panose="020B0604020202020204" pitchFamily="34" charset="0"/>
+                <a:cs typeface="Arial" panose="020B0604020202020204" pitchFamily="34" charset="0"/>
+              </a:defRPr>
+            </a:lvl4pPr>
+            <a:lvl5pPr marL="2057400" indent="-228600" eaLnBrk="0" hangingPunct="0">
+              <a:defRPr>
+                <a:solidFill>
+                  <a:schemeClr val="tx1"/>
+                </a:solidFill>
+                <a:latin typeface="Arial" panose="020B0604020202020204" pitchFamily="34" charset="0"/>
+                <a:cs typeface="Arial" panose="020B0604020202020204" pitchFamily="34" charset="0"/>
+              </a:defRPr>
+            </a:lvl5pPr>
+            <a:lvl6pPr marL="2514600" indent="-228600" eaLnBrk="0" fontAlgn="base" hangingPunct="0">
+              <a:spcBef>
+                <a:spcPct val="0"/>
+              </a:spcBef>
+              <a:spcAft>
+                <a:spcPct val="0"/>
+              </a:spcAft>
+              <a:defRPr>
+                <a:solidFill>
+                  <a:schemeClr val="tx1"/>
+                </a:solidFill>
+                <a:latin typeface="Arial" panose="020B0604020202020204" pitchFamily="34" charset="0"/>
+                <a:cs typeface="Arial" panose="020B0604020202020204" pitchFamily="34" charset="0"/>
+              </a:defRPr>
+            </a:lvl6pPr>
+            <a:lvl7pPr marL="2971800" indent="-228600" eaLnBrk="0" fontAlgn="base" hangingPunct="0">
+              <a:spcBef>
+                <a:spcPct val="0"/>
+              </a:spcBef>
+              <a:spcAft>
+                <a:spcPct val="0"/>
+              </a:spcAft>
+              <a:defRPr>
+                <a:solidFill>
+                  <a:schemeClr val="tx1"/>
+                </a:solidFill>
+                <a:latin typeface="Arial" panose="020B0604020202020204" pitchFamily="34" charset="0"/>
+                <a:cs typeface="Arial" panose="020B0604020202020204" pitchFamily="34" charset="0"/>
+              </a:defRPr>
+            </a:lvl7pPr>
+            <a:lvl8pPr marL="3429000" indent="-228600" eaLnBrk="0" fontAlgn="base" hangingPunct="0">
+              <a:spcBef>
+                <a:spcPct val="0"/>
+              </a:spcBef>
+              <a:spcAft>
+                <a:spcPct val="0"/>
+              </a:spcAft>
+              <a:defRPr>
+                <a:solidFill>
+                  <a:schemeClr val="tx1"/>
+                </a:solidFill>
+                <a:latin typeface="Arial" panose="020B0604020202020204" pitchFamily="34" charset="0"/>
+                <a:cs typeface="Arial" panose="020B0604020202020204" pitchFamily="34" charset="0"/>
+              </a:defRPr>
+            </a:lvl8pPr>
+            <a:lvl9pPr marL="3886200" indent="-228600" eaLnBrk="0" fontAlgn="base" hangingPunct="0">
+              <a:spcBef>
+                <a:spcPct val="0"/>
+              </a:spcBef>
+              <a:spcAft>
+                <a:spcPct val="0"/>
+              </a:spcAft>
+              <a:defRPr>
+                <a:solidFill>
+                  <a:schemeClr val="tx1"/>
+                </a:solidFill>
+                <a:latin typeface="Arial" panose="020B0604020202020204" pitchFamily="34" charset="0"/>
+                <a:cs typeface="Arial" panose="020B0604020202020204" pitchFamily="34" charset="0"/>
+              </a:defRPr>
+            </a:lvl9pPr>
+          </a:lstStyle>
+          <a:p>
+            <a:pPr algn="r" eaLnBrk="1" hangingPunct="1"/>
+            <a:r>
+              <a:rPr lang="en-US" altLang="en-US" sz="1350" dirty="0" smtClean="0"/>
+              <a:t>SICAS Summit 2017, </a:t>
+            </a:r>
+            <a:r>
+              <a:rPr lang="en-US" altLang="en-US" sz="1350" dirty="0"/>
+              <a:t>Villa Roma</a:t>
+            </a:r>
+          </a:p>
+        </p:txBody>
+      </p:sp>
+    </p:spTree>
+    <p:extLst>
+      <p:ext uri="{BB962C8B-B14F-4D97-AF65-F5344CB8AC3E}">
+        <p14:creationId xmlns:p14="http://schemas.microsoft.com/office/powerpoint/2010/main" val="1129601960"/>
+      </p:ext>
+    </p:extLst>
+  </p:cSld>
+  <p:clrMapOvr>
+    <a:masterClrMapping/>
+  </p:clrMapOvr>
+  <mc:AlternateContent xmlns:mc="http://schemas.openxmlformats.org/markup-compatibility/2006" xmlns:p14="http://schemas.microsoft.com/office/powerpoint/2010/main">
+    <mc:Choice Requires="p14">
+      <p:transition spd="med" p14:dur="700">
+        <p:fade/>
+      </p:transition>
+    </mc:Choice>
+    <mc:Fallback xmlns="">
+      <p:transition spd="med">
+        <p:fade/>
+      </p:transition>
+    </mc:Fallback>
+  </mc:AlternateContent>
+  <p:timing>
+    <p:tnLst>
+      <p:par>
+        <p:cTn id="1" dur="indefinite" restart="never" nodeType="tmRoot"/>
+      </p:par>
+    </p:tnLst>
+  </p:timing>
+</p:sld>
+</file>
+
+<file path=ppt/slides/slide8.xml><?xml version="1.0" encoding="utf-8"?>
+<p:sld xmlns:a="http://schemas.openxmlformats.org/drawingml/2006/main" xmlns:r="http://schemas.openxmlformats.org/officeDocument/2006/relationships" xmlns:p="http://schemas.openxmlformats.org/presentationml/2006/main">
+  <p:cSld>
+    <p:spTree>
+      <p:nvGrpSpPr>
+        <p:cNvPr id="1" name=""/>
+        <p:cNvGrpSpPr/>
+        <p:nvPr/>
+      </p:nvGrpSpPr>
+      <p:grpSpPr>
+        <a:xfrm>
+          <a:off x="0" y="0"/>
+          <a:ext cx="0" cy="0"/>
+          <a:chOff x="0" y="0"/>
+          <a:chExt cx="0" cy="0"/>
+        </a:xfrm>
+      </p:grpSpPr>
+      <p:sp>
+        <p:nvSpPr>
+          <p:cNvPr id="2" name="Title 1"/>
+          <p:cNvSpPr>
+            <a:spLocks noGrp="1"/>
+          </p:cNvSpPr>
+          <p:nvPr>
+            <p:ph type="title"/>
+          </p:nvPr>
+        </p:nvSpPr>
+        <p:spPr/>
+        <p:txBody>
+          <a:bodyPr>
+            <a:normAutofit/>
+          </a:bodyPr>
+          <a:lstStyle/>
+          <a:p>
+            <a:r>
+              <a:rPr lang="en-US" sz="4800" dirty="0">
+                <a:solidFill>
+                  <a:schemeClr val="accent1">
+                    <a:lumMod val="75000"/>
+                  </a:schemeClr>
+                </a:solidFill>
+              </a:rPr>
+              <a:t>Slide Heading Here</a:t>
+            </a:r>
+          </a:p>
+        </p:txBody>
+      </p:sp>
+      <p:sp>
+        <p:nvSpPr>
+          <p:cNvPr id="3" name="Text Placeholder 2"/>
+          <p:cNvSpPr>
+            <a:spLocks noGrp="1"/>
+          </p:cNvSpPr>
+          <p:nvPr>
+            <p:ph idx="1"/>
+          </p:nvPr>
+        </p:nvSpPr>
+        <p:spPr/>
+        <p:txBody>
+          <a:bodyPr/>
+          <a:lstStyle/>
+          <a:p>
+            <a:pPr marL="198935" indent="-198935">
+              <a:lnSpc>
+                <a:spcPct val="100000"/>
+              </a:lnSpc>
+              <a:buFont typeface="Wingdings 2"/>
+              <a:buChar char=""/>
+              <a:defRPr/>
+            </a:pPr>
+            <a:r>
+              <a:rPr lang="en-US" dirty="0"/>
+              <a:t>Presentation Text</a:t>
+            </a:r>
+          </a:p>
+          <a:p>
+            <a:pPr marL="377291" lvl="3" indent="-198935">
+              <a:lnSpc>
+                <a:spcPct val="100000"/>
+              </a:lnSpc>
+              <a:spcBef>
+                <a:spcPts val="173"/>
+              </a:spcBef>
+              <a:buSzPct val="80000"/>
+              <a:buFont typeface="Wingdings 2"/>
+              <a:buChar char=""/>
+              <a:defRPr/>
+            </a:pPr>
+            <a:r>
+              <a:rPr lang="en-US" sz="1500" dirty="0"/>
+              <a:t>Screen Captures</a:t>
+            </a:r>
+          </a:p>
+          <a:p>
+            <a:pPr marL="377291" lvl="3" indent="-198935">
+              <a:lnSpc>
+                <a:spcPct val="100000"/>
+              </a:lnSpc>
+              <a:spcBef>
+                <a:spcPts val="173"/>
+              </a:spcBef>
+              <a:buSzPct val="80000"/>
+              <a:buFont typeface="Wingdings 2"/>
+              <a:buChar char=""/>
+              <a:defRPr/>
+            </a:pPr>
+            <a:r>
+              <a:rPr lang="en-US" sz="1500" dirty="0"/>
+              <a:t>Etc.</a:t>
+            </a:r>
+          </a:p>
+          <a:p>
+            <a:pPr marL="198935" indent="-198935">
+              <a:lnSpc>
+                <a:spcPct val="100000"/>
+              </a:lnSpc>
+              <a:buFont typeface="Wingdings 2"/>
+              <a:buChar char=""/>
+              <a:defRPr/>
+            </a:pPr>
+            <a:r>
+              <a:rPr lang="en-US" dirty="0"/>
+              <a:t>Presenters – duplicate this slide as many times as needed</a:t>
+            </a:r>
+          </a:p>
+          <a:p>
+            <a:endParaRPr lang="en-US" dirty="0"/>
+          </a:p>
+        </p:txBody>
+      </p:sp>
+      <p:sp>
+        <p:nvSpPr>
+          <p:cNvPr id="7" name="TextBox 3"/>
+          <p:cNvSpPr txBox="1">
+            <a:spLocks noChangeArrowheads="1"/>
+          </p:cNvSpPr>
+          <p:nvPr/>
+        </p:nvSpPr>
+        <p:spPr bwMode="auto">
+          <a:xfrm>
+            <a:off x="6159883" y="6477000"/>
+            <a:ext cx="2858244" cy="300082"/>
+          </a:xfrm>
+          <a:prstGeom prst="rect">
+            <a:avLst/>
+          </a:prstGeom>
+          <a:noFill/>
+          <a:ln>
+            <a:noFill/>
+          </a:ln>
+          <a:extLst>
+            <a:ext uri="{909E8E84-426E-40DD-AFC4-6F175D3DCCD1}">
+              <a14:hiddenFill xmlns:a14="http://schemas.microsoft.com/office/drawing/2010/main">
+                <a:solidFill>
+                  <a:srgbClr val="FFFFFF"/>
+                </a:solidFill>
+              </a14:hiddenFill>
+            </a:ext>
+            <a:ext uri="{91240B29-F687-4F45-9708-019B960494DF}">
+              <a14:hiddenLine xmlns:a14="http://schemas.microsoft.com/office/drawing/2010/main" w="9525">
+                <a:solidFill>
+                  <a:srgbClr val="000000"/>
+                </a:solidFill>
+                <a:miter lim="800000"/>
+                <a:headEnd/>
+                <a:tailEnd/>
+              </a14:hiddenLine>
+            </a:ext>
+          </a:extLst>
+        </p:spPr>
+        <p:txBody>
+          <a:bodyPr>
+            <a:spAutoFit/>
+          </a:bodyPr>
+          <a:lstStyle>
+            <a:lvl1pPr eaLnBrk="0" hangingPunct="0">
+              <a:defRPr>
+                <a:solidFill>
+                  <a:schemeClr val="tx1"/>
+                </a:solidFill>
+                <a:latin typeface="Arial" panose="020B0604020202020204" pitchFamily="34" charset="0"/>
+                <a:cs typeface="Arial" panose="020B0604020202020204" pitchFamily="34" charset="0"/>
+              </a:defRPr>
+            </a:lvl1pPr>
+            <a:lvl2pPr marL="742950" indent="-285750" eaLnBrk="0" hangingPunct="0">
+              <a:defRPr>
+                <a:solidFill>
+                  <a:schemeClr val="tx1"/>
+                </a:solidFill>
+                <a:latin typeface="Arial" panose="020B0604020202020204" pitchFamily="34" charset="0"/>
+                <a:cs typeface="Arial" panose="020B0604020202020204" pitchFamily="34" charset="0"/>
+              </a:defRPr>
+            </a:lvl2pPr>
+            <a:lvl3pPr marL="1143000" indent="-228600" eaLnBrk="0" hangingPunct="0">
+              <a:defRPr>
+                <a:solidFill>
+                  <a:schemeClr val="tx1"/>
+                </a:solidFill>
+                <a:latin typeface="Arial" panose="020B0604020202020204" pitchFamily="34" charset="0"/>
+                <a:cs typeface="Arial" panose="020B0604020202020204" pitchFamily="34" charset="0"/>
+              </a:defRPr>
+            </a:lvl3pPr>
+            <a:lvl4pPr marL="1600200" indent="-228600" eaLnBrk="0" hangingPunct="0">
+              <a:defRPr>
+                <a:solidFill>
+                  <a:schemeClr val="tx1"/>
+                </a:solidFill>
+                <a:latin typeface="Arial" panose="020B0604020202020204" pitchFamily="34" charset="0"/>
+                <a:cs typeface="Arial" panose="020B0604020202020204" pitchFamily="34" charset="0"/>
+              </a:defRPr>
+            </a:lvl4pPr>
+            <a:lvl5pPr marL="2057400" indent="-228600" eaLnBrk="0" hangingPunct="0">
+              <a:defRPr>
+                <a:solidFill>
+                  <a:schemeClr val="tx1"/>
+                </a:solidFill>
+                <a:latin typeface="Arial" panose="020B0604020202020204" pitchFamily="34" charset="0"/>
+                <a:cs typeface="Arial" panose="020B0604020202020204" pitchFamily="34" charset="0"/>
+              </a:defRPr>
+            </a:lvl5pPr>
+            <a:lvl6pPr marL="2514600" indent="-228600" eaLnBrk="0" fontAlgn="base" hangingPunct="0">
+              <a:spcBef>
+                <a:spcPct val="0"/>
+              </a:spcBef>
+              <a:spcAft>
+                <a:spcPct val="0"/>
+              </a:spcAft>
+              <a:defRPr>
+                <a:solidFill>
+                  <a:schemeClr val="tx1"/>
+                </a:solidFill>
+                <a:latin typeface="Arial" panose="020B0604020202020204" pitchFamily="34" charset="0"/>
+                <a:cs typeface="Arial" panose="020B0604020202020204" pitchFamily="34" charset="0"/>
+              </a:defRPr>
+            </a:lvl6pPr>
+            <a:lvl7pPr marL="2971800" indent="-228600" eaLnBrk="0" fontAlgn="base" hangingPunct="0">
+              <a:spcBef>
+                <a:spcPct val="0"/>
+              </a:spcBef>
+              <a:spcAft>
+                <a:spcPct val="0"/>
+              </a:spcAft>
+              <a:defRPr>
+                <a:solidFill>
+                  <a:schemeClr val="tx1"/>
+                </a:solidFill>
+                <a:latin typeface="Arial" panose="020B0604020202020204" pitchFamily="34" charset="0"/>
+                <a:cs typeface="Arial" panose="020B0604020202020204" pitchFamily="34" charset="0"/>
+              </a:defRPr>
+            </a:lvl7pPr>
+            <a:lvl8pPr marL="3429000" indent="-228600" eaLnBrk="0" fontAlgn="base" hangingPunct="0">
+              <a:spcBef>
+                <a:spcPct val="0"/>
+              </a:spcBef>
+              <a:spcAft>
+                <a:spcPct val="0"/>
+              </a:spcAft>
+              <a:defRPr>
+                <a:solidFill>
+                  <a:schemeClr val="tx1"/>
+                </a:solidFill>
+                <a:latin typeface="Arial" panose="020B0604020202020204" pitchFamily="34" charset="0"/>
+                <a:cs typeface="Arial" panose="020B0604020202020204" pitchFamily="34" charset="0"/>
+              </a:defRPr>
+            </a:lvl8pPr>
+            <a:lvl9pPr marL="3886200" indent="-228600" eaLnBrk="0" fontAlgn="base" hangingPunct="0">
+              <a:spcBef>
+                <a:spcPct val="0"/>
+              </a:spcBef>
+              <a:spcAft>
+                <a:spcPct val="0"/>
+              </a:spcAft>
+              <a:defRPr>
+                <a:solidFill>
+                  <a:schemeClr val="tx1"/>
+                </a:solidFill>
+                <a:latin typeface="Arial" panose="020B0604020202020204" pitchFamily="34" charset="0"/>
+                <a:cs typeface="Arial" panose="020B0604020202020204" pitchFamily="34" charset="0"/>
+              </a:defRPr>
+            </a:lvl9pPr>
+          </a:lstStyle>
+          <a:p>
+            <a:pPr algn="r" eaLnBrk="1" hangingPunct="1"/>
+            <a:r>
+              <a:rPr lang="en-US" altLang="en-US" sz="1350" dirty="0" smtClean="0"/>
+              <a:t>SICAS Summit 2017, </a:t>
+            </a:r>
+            <a:r>
+              <a:rPr lang="en-US" altLang="en-US" sz="1350" dirty="0"/>
+              <a:t>Villa Roma</a:t>
+            </a:r>
+          </a:p>
+        </p:txBody>
+      </p:sp>
+    </p:spTree>
+    <p:extLst>
+      <p:ext uri="{BB962C8B-B14F-4D97-AF65-F5344CB8AC3E}">
+        <p14:creationId xmlns:p14="http://schemas.microsoft.com/office/powerpoint/2010/main" val="4213463430"/>
       </p:ext>
     </p:extLst>
   </p:cSld>

</xml_diff>

<commit_message>
More changes to powerpoint
</commit_message>
<xml_diff>
--- a/docs/SICAS_2017/Drop-InReportingWithGroovy.pptx
+++ b/docs/SICAS_2017/Drop-InReportingWithGroovy.pptx
@@ -5955,7 +5955,7 @@
         <p:spPr/>
         <p:txBody>
           <a:bodyPr>
-            <a:normAutofit/>
+            <a:normAutofit lnSpcReduction="10000"/>
           </a:bodyPr>
           <a:lstStyle/>
           <a:p>
@@ -5971,25 +5971,6 @@
               <a:rPr lang="en-US" dirty="0" smtClean="0"/>
               <a:t>Oracle Reports is Going Away.</a:t>
             </a:r>
-          </a:p>
-          <a:p>
-            <a:pPr marL="491543" lvl="1" indent="-198935">
-              <a:lnSpc>
-                <a:spcPct val="100000"/>
-              </a:lnSpc>
-              <a:buFont typeface="Wingdings 2"/>
-              <a:buChar char=""/>
-              <a:defRPr/>
-            </a:pPr>
-            <a:r>
-              <a:rPr lang="en-US" dirty="0" smtClean="0"/>
-              <a:t>Oracle has been giving gentle hints for some time that we shoul</a:t>
-            </a:r>
-            <a:r>
-              <a:rPr lang="en-US" dirty="0" smtClean="0"/>
-              <a:t>d move on to another tool.</a:t>
-            </a:r>
-            <a:endParaRPr lang="en-US" dirty="0" smtClean="0"/>
           </a:p>
           <a:p>
             <a:pPr marL="491543" lvl="1" indent="-198935">
@@ -6048,6 +6029,36 @@
               <a:rPr lang="en-US" dirty="0"/>
               <a:t>We created over 600 Oracle Reports applications in the 15 years we’ve been using Banner</a:t>
             </a:r>
+          </a:p>
+          <a:p>
+            <a:pPr marL="491543" lvl="1" indent="-198935">
+              <a:lnSpc>
+                <a:spcPct val="100000"/>
+              </a:lnSpc>
+              <a:buFont typeface="Wingdings 2"/>
+              <a:buChar char=""/>
+              <a:defRPr/>
+            </a:pPr>
+            <a:endParaRPr lang="en-US" dirty="0" smtClean="0"/>
+          </a:p>
+          <a:p>
+            <a:pPr marL="491543" lvl="1" indent="-198935">
+              <a:lnSpc>
+                <a:spcPct val="100000"/>
+              </a:lnSpc>
+              <a:buFont typeface="Wingdings 2"/>
+              <a:buChar char=""/>
+              <a:defRPr/>
+            </a:pPr>
+            <a:r>
+              <a:rPr lang="en-US" dirty="0" smtClean="0"/>
+              <a:t>Oracle has been giving gentle hints for some time that we shoul</a:t>
+            </a:r>
+            <a:r>
+              <a:rPr lang="en-US" dirty="0" smtClean="0"/>
+              <a:t>d move on to another tool.</a:t>
+            </a:r>
+            <a:endParaRPr lang="en-US" dirty="0" smtClean="0"/>
           </a:p>
           <a:p>
             <a:pPr marL="491543" lvl="1" indent="-198935">
@@ -6311,15 +6322,22 @@
           <a:lstStyle/>
           <a:p>
             <a:r>
-              <a:rPr lang="en-US" sz="4800" dirty="0">
+              <a:rPr lang="en-US" sz="4800" dirty="0" smtClean="0">
                 <a:solidFill>
                   <a:schemeClr val="accent1">
                     <a:lumMod val="75000"/>
                   </a:schemeClr>
                 </a:solidFill>
               </a:rPr>
-              <a:t>Slide Heading Here</a:t>
-            </a:r>
+              <a:t>It Started with a Dream…</a:t>
+            </a:r>
+            <a:endParaRPr lang="en-US" sz="4800" dirty="0">
+              <a:solidFill>
+                <a:schemeClr val="accent1">
+                  <a:lumMod val="75000"/>
+                </a:schemeClr>
+              </a:solidFill>
+            </a:endParaRPr>
           </a:p>
         </p:txBody>
       </p:sp>

</xml_diff>

<commit_message>
Add description of Groovy
</commit_message>
<xml_diff>
--- a/docs/SICAS_2017/Drop-InReportingWithGroovy.pptx
+++ b/docs/SICAS_2017/Drop-InReportingWithGroovy.pptx
@@ -14,9 +14,9 @@
     <p:sldId id="265" r:id="rId3"/>
     <p:sldId id="310" r:id="rId4"/>
     <p:sldId id="315" r:id="rId5"/>
-    <p:sldId id="314" r:id="rId6"/>
-    <p:sldId id="316" r:id="rId7"/>
-    <p:sldId id="317" r:id="rId8"/>
+    <p:sldId id="316" r:id="rId6"/>
+    <p:sldId id="317" r:id="rId7"/>
+    <p:sldId id="314" r:id="rId8"/>
     <p:sldId id="318" r:id="rId9"/>
     <p:sldId id="319" r:id="rId10"/>
   </p:sldIdLst>
@@ -224,7 +224,7 @@
           <a:p>
             <a:fld id="{59088EAF-6ECA-4616-85EF-35AA19C641F3}" type="datetimeFigureOut">
               <a:rPr lang="en-US"/>
-              <a:t>8/25/2017</a:t>
+              <a:t>8/28/2017</a:t>
             </a:fld>
             <a:endParaRPr/>
           </a:p>
@@ -389,7 +389,7 @@
           <a:p>
             <a:fld id="{3ABD2D7A-D230-4F91-BD59-0A39C2703BA8}" type="datetimeFigureOut">
               <a:rPr lang="en-US"/>
-              <a:t>8/25/2017</a:t>
+              <a:t>8/28/2017</a:t>
             </a:fld>
             <a:endParaRPr/>
           </a:p>
@@ -883,7 +883,7 @@
             <a:fld id="{B61BEF0D-F0BB-DE4B-95CE-6DB70DBA9567}" type="datetimeFigureOut">
               <a:rPr lang="en-US" smtClean="0"/>
               <a:pPr/>
-              <a:t>8/25/2017</a:t>
+              <a:t>8/28/2017</a:t>
             </a:fld>
             <a:endParaRPr lang="en-US" dirty="0"/>
           </a:p>
@@ -1111,7 +1111,7 @@
           <a:p>
             <a:fld id="{03F41C87-7AD9-4845-A077-840E4A0F3F06}" type="datetimeFigureOut">
               <a:rPr lang="en-US" smtClean="0"/>
-              <a:t>8/25/2017</a:t>
+              <a:t>8/28/2017</a:t>
             </a:fld>
             <a:endParaRPr lang="en-US"/>
           </a:p>
@@ -1386,7 +1386,7 @@
           <a:p>
             <a:fld id="{03F41C87-7AD9-4845-A077-840E4A0F3F06}" type="datetimeFigureOut">
               <a:rPr lang="en-US" smtClean="0"/>
-              <a:t>8/25/2017</a:t>
+              <a:t>8/28/2017</a:t>
             </a:fld>
             <a:endParaRPr lang="en-US"/>
           </a:p>
@@ -1575,7 +1575,7 @@
           <a:p>
             <a:fld id="{03F41C87-7AD9-4845-A077-840E4A0F3F06}" type="datetimeFigureOut">
               <a:rPr lang="en-US" smtClean="0"/>
-              <a:t>8/25/2017</a:t>
+              <a:t>8/28/2017</a:t>
             </a:fld>
             <a:endParaRPr lang="en-US"/>
           </a:p>
@@ -1937,7 +1937,7 @@
           <a:p>
             <a:fld id="{03F41C87-7AD9-4845-A077-840E4A0F3F06}" type="datetimeFigureOut">
               <a:rPr lang="en-US" smtClean="0"/>
-              <a:t>8/25/2017</a:t>
+              <a:t>8/28/2017</a:t>
             </a:fld>
             <a:endParaRPr lang="en-US"/>
           </a:p>
@@ -2231,7 +2231,7 @@
           <a:p>
             <a:fld id="{03F41C87-7AD9-4845-A077-840E4A0F3F06}" type="datetimeFigureOut">
               <a:rPr lang="en-US" smtClean="0"/>
-              <a:t>8/25/2017</a:t>
+              <a:t>8/28/2017</a:t>
             </a:fld>
             <a:endParaRPr lang="en-US"/>
           </a:p>
@@ -2634,7 +2634,7 @@
           <a:p>
             <a:fld id="{03F41C87-7AD9-4845-A077-840E4A0F3F06}" type="datetimeFigureOut">
               <a:rPr lang="en-US" smtClean="0"/>
-              <a:t>8/25/2017</a:t>
+              <a:t>8/28/2017</a:t>
             </a:fld>
             <a:endParaRPr lang="en-US"/>
           </a:p>
@@ -2776,7 +2776,7 @@
           <a:p>
             <a:fld id="{03F41C87-7AD9-4845-A077-840E4A0F3F06}" type="datetimeFigureOut">
               <a:rPr lang="en-US" smtClean="0"/>
-              <a:t>8/25/2017</a:t>
+              <a:t>8/28/2017</a:t>
             </a:fld>
             <a:endParaRPr lang="en-US"/>
           </a:p>
@@ -2966,7 +2966,7 @@
           <a:p>
             <a:fld id="{03F41C87-7AD9-4845-A077-840E4A0F3F06}" type="datetimeFigureOut">
               <a:rPr lang="en-US" smtClean="0"/>
-              <a:t>8/25/2017</a:t>
+              <a:t>8/28/2017</a:t>
             </a:fld>
             <a:endParaRPr lang="en-US"/>
           </a:p>
@@ -3339,7 +3339,7 @@
           <a:p>
             <a:fld id="{03F41C87-7AD9-4845-A077-840E4A0F3F06}" type="datetimeFigureOut">
               <a:rPr lang="en-US" smtClean="0"/>
-              <a:t>8/25/2017</a:t>
+              <a:t>8/28/2017</a:t>
             </a:fld>
             <a:endParaRPr lang="en-US"/>
           </a:p>
@@ -3741,7 +3741,7 @@
             <a:fld id="{03F41C87-7AD9-4845-A077-840E4A0F3F06}" type="datetimeFigureOut">
               <a:rPr lang="en-US" smtClean="0"/>
               <a:pPr/>
-              <a:t>8/25/2017</a:t>
+              <a:t>8/28/2017</a:t>
             </a:fld>
             <a:endParaRPr lang="en-US"/>
           </a:p>
@@ -4049,7 +4049,7 @@
             <a:fld id="{03F41C87-7AD9-4845-A077-840E4A0F3F06}" type="datetimeFigureOut">
               <a:rPr lang="en-US" smtClean="0"/>
               <a:pPr/>
-              <a:t>8/25/2017</a:t>
+              <a:t>8/28/2017</a:t>
             </a:fld>
             <a:endParaRPr lang="en-US"/>
           </a:p>
@@ -5344,11 +5344,7 @@
             </a:pPr>
             <a:r>
               <a:rPr lang="en-US" dirty="0" smtClean="0"/>
-              <a:t>Edward </a:t>
-            </a:r>
-            <a:r>
-              <a:rPr lang="en-US" dirty="0" smtClean="0"/>
-              <a:t>Cole – Senior Programmer/Analyst</a:t>
+              <a:t>Edward Cole </a:t>
             </a:r>
             <a:endParaRPr lang="en-US" dirty="0"/>
           </a:p>
@@ -5360,8 +5356,51 @@
             </a:pPr>
             <a:r>
               <a:rPr lang="en-US" dirty="0" smtClean="0"/>
-              <a:t>Jamestown Community College</a:t>
-            </a:r>
+              <a:t>Jamestown </a:t>
+            </a:r>
+            <a:r>
+              <a:rPr lang="en-US" dirty="0" smtClean="0"/>
+              <a:t>Community </a:t>
+            </a:r>
+            <a:r>
+              <a:rPr lang="en-US" dirty="0" smtClean="0"/>
+              <a:t>College</a:t>
+            </a:r>
+            <a:endParaRPr lang="en-US" dirty="0"/>
+          </a:p>
+          <a:p>
+            <a:pPr marL="198935" indent="-198935">
+              <a:buFont typeface="Wingdings 2"/>
+              <a:buChar char=""/>
+              <a:defRPr/>
+            </a:pPr>
+            <a:r>
+              <a:rPr lang="en-US" dirty="0" smtClean="0"/>
+              <a:t> </a:t>
+            </a:r>
+            <a:r>
+              <a:rPr lang="en-US" dirty="0"/>
+              <a:t>Senior </a:t>
+            </a:r>
+            <a:r>
+              <a:rPr lang="en-US" dirty="0" smtClean="0"/>
+              <a:t>Programmer/Analyst with almost 25 years of experience with Oracle database programming.</a:t>
+            </a:r>
+            <a:endParaRPr lang="en-US" dirty="0"/>
+          </a:p>
+          <a:p>
+            <a:pPr marL="198935" indent="-198935">
+              <a:buFont typeface="Wingdings 2"/>
+              <a:buChar char=""/>
+              <a:defRPr/>
+            </a:pPr>
+            <a:endParaRPr lang="en-US" dirty="0" smtClean="0"/>
+          </a:p>
+          <a:p>
+            <a:pPr marL="0" indent="0">
+              <a:buNone/>
+              <a:defRPr/>
+            </a:pPr>
             <a:endParaRPr lang="en-US" dirty="0"/>
           </a:p>
         </p:txBody>
@@ -5597,15 +5636,22 @@
           <a:lstStyle/>
           <a:p>
             <a:r>
-              <a:rPr lang="en-US" sz="4800" dirty="0">
+              <a:rPr lang="en-US" sz="4800" dirty="0" smtClean="0">
                 <a:solidFill>
                   <a:schemeClr val="accent1">
                     <a:lumMod val="75000"/>
                   </a:schemeClr>
                 </a:solidFill>
               </a:rPr>
-              <a:t>Slide Heading Here</a:t>
-            </a:r>
+              <a:t>A Real Solution to a Real Problem</a:t>
+            </a:r>
+            <a:endParaRPr lang="en-US" sz="4800" dirty="0">
+              <a:solidFill>
+                <a:schemeClr val="accent1">
+                  <a:lumMod val="75000"/>
+                </a:schemeClr>
+              </a:solidFill>
+            </a:endParaRPr>
           </a:p>
         </p:txBody>
       </p:sp>
@@ -5621,7 +5667,9 @@
         </p:nvSpPr>
         <p:spPr/>
         <p:txBody>
-          <a:bodyPr/>
+          <a:bodyPr>
+            <a:normAutofit lnSpcReduction="10000"/>
+          </a:bodyPr>
           <a:lstStyle/>
           <a:p>
             <a:pPr marL="198935" indent="-198935">
@@ -5633,48 +5681,12 @@
               <a:defRPr/>
             </a:pPr>
             <a:r>
-              <a:rPr lang="en-US" dirty="0"/>
-              <a:t>Presentation Text</a:t>
-            </a:r>
-          </a:p>
-          <a:p>
-            <a:pPr marL="377291" lvl="3" indent="-198935">
-              <a:lnSpc>
-                <a:spcPct val="100000"/>
-              </a:lnSpc>
-              <a:spcBef>
-                <a:spcPts val="173"/>
-              </a:spcBef>
-              <a:buSzPct val="80000"/>
-              <a:buFont typeface="Wingdings 2"/>
-              <a:buChar char=""/>
-              <a:defRPr/>
-            </a:pPr>
-            <a:r>
-              <a:rPr lang="en-US" sz="1500" dirty="0"/>
-              <a:t>Screen Captures</a:t>
-            </a:r>
-          </a:p>
-          <a:p>
-            <a:pPr marL="377291" lvl="3" indent="-198935">
-              <a:lnSpc>
-                <a:spcPct val="100000"/>
-              </a:lnSpc>
-              <a:spcBef>
-                <a:spcPts val="173"/>
-              </a:spcBef>
-              <a:buSzPct val="80000"/>
-              <a:buFont typeface="Wingdings 2"/>
-              <a:buChar char=""/>
-              <a:defRPr/>
-            </a:pPr>
-            <a:r>
-              <a:rPr lang="en-US" sz="1500" dirty="0"/>
-              <a:t>Etc.</a:t>
-            </a:r>
-          </a:p>
-          <a:p>
-            <a:pPr marL="198935" indent="-198935">
+              <a:rPr lang="en-US" dirty="0" smtClean="0"/>
+              <a:t>Oracle Reports is Going Away.</a:t>
+            </a:r>
+          </a:p>
+          <a:p>
+            <a:pPr marL="491543" lvl="1" indent="-198935">
               <a:lnSpc>
                 <a:spcPct val="100000"/>
               </a:lnSpc>
@@ -5682,10 +5694,105 @@
               <a:buChar char=""/>
               <a:defRPr/>
             </a:pPr>
+            <a:endParaRPr lang="en-US" dirty="0" smtClean="0"/>
+          </a:p>
+          <a:p>
+            <a:pPr marL="491543" lvl="1" indent="-198935">
+              <a:lnSpc>
+                <a:spcPct val="100000"/>
+              </a:lnSpc>
+              <a:buFont typeface="Wingdings 2"/>
+              <a:buChar char=""/>
+              <a:defRPr/>
+            </a:pPr>
+            <a:r>
+              <a:rPr lang="en-US" dirty="0" smtClean="0"/>
+              <a:t>We’ve </a:t>
+            </a:r>
             <a:r>
               <a:rPr lang="en-US" dirty="0"/>
-              <a:t>Presenters – duplicate this slide as many times as needed</a:t>
-            </a:r>
+              <a:t>used Oracle Reports as our primary reporting tool since we started using Oracle, almost 25 years ago</a:t>
+            </a:r>
+            <a:r>
+              <a:rPr lang="en-US" dirty="0" smtClean="0"/>
+              <a:t>.</a:t>
+            </a:r>
+          </a:p>
+          <a:p>
+            <a:pPr marL="491543" lvl="1" indent="-198935">
+              <a:lnSpc>
+                <a:spcPct val="100000"/>
+              </a:lnSpc>
+              <a:buFont typeface="Wingdings 2"/>
+              <a:buChar char=""/>
+              <a:defRPr/>
+            </a:pPr>
+            <a:endParaRPr lang="en-US" dirty="0"/>
+          </a:p>
+          <a:p>
+            <a:pPr marL="491543" lvl="1" indent="-198935">
+              <a:lnSpc>
+                <a:spcPct val="100000"/>
+              </a:lnSpc>
+              <a:buFont typeface="Wingdings 2"/>
+              <a:buChar char=""/>
+              <a:defRPr/>
+            </a:pPr>
+            <a:r>
+              <a:rPr lang="en-US" dirty="0"/>
+              <a:t>We created over 600 Oracle Reports applications in the 15 years we’ve been using Banner</a:t>
+            </a:r>
+          </a:p>
+          <a:p>
+            <a:pPr marL="491543" lvl="1" indent="-198935">
+              <a:lnSpc>
+                <a:spcPct val="100000"/>
+              </a:lnSpc>
+              <a:buFont typeface="Wingdings 2"/>
+              <a:buChar char=""/>
+              <a:defRPr/>
+            </a:pPr>
+            <a:endParaRPr lang="en-US" dirty="0" smtClean="0"/>
+          </a:p>
+          <a:p>
+            <a:pPr marL="491543" lvl="1" indent="-198935">
+              <a:lnSpc>
+                <a:spcPct val="100000"/>
+              </a:lnSpc>
+              <a:buFont typeface="Wingdings 2"/>
+              <a:buChar char=""/>
+              <a:defRPr/>
+            </a:pPr>
+            <a:r>
+              <a:rPr lang="en-US" dirty="0" smtClean="0"/>
+              <a:t>Oracle has been giving gentle hints for some time that we should move on to another tool.</a:t>
+            </a:r>
+          </a:p>
+          <a:p>
+            <a:pPr marL="491543" lvl="1" indent="-198935">
+              <a:lnSpc>
+                <a:spcPct val="100000"/>
+              </a:lnSpc>
+              <a:buFont typeface="Wingdings 2"/>
+              <a:buChar char=""/>
+              <a:defRPr/>
+            </a:pPr>
+            <a:endParaRPr lang="en-US" dirty="0" smtClean="0"/>
+          </a:p>
+          <a:p>
+            <a:pPr marL="491543" lvl="1" indent="-198935">
+              <a:lnSpc>
+                <a:spcPct val="100000"/>
+              </a:lnSpc>
+              <a:buFont typeface="Wingdings 2"/>
+              <a:buChar char=""/>
+              <a:defRPr/>
+            </a:pPr>
+            <a:r>
+              <a:rPr lang="en-US" dirty="0" smtClean="0"/>
+              <a:t>It never did a good job of producing data extracts, which many of our users prefer to a printed report these days.</a:t>
+            </a:r>
+            <a:endParaRPr lang="en-US" dirty="0"/>
           </a:p>
           <a:p>
             <a:endParaRPr lang="en-US" dirty="0"/>
@@ -5859,7 +5966,7 @@
     </p:spTree>
     <p:extLst>
       <p:ext uri="{BB962C8B-B14F-4D97-AF65-F5344CB8AC3E}">
-        <p14:creationId xmlns:p14="http://schemas.microsoft.com/office/powerpoint/2010/main" val="2478160142"/>
+        <p14:creationId xmlns:p14="http://schemas.microsoft.com/office/powerpoint/2010/main" val="3896415091"/>
       </p:ext>
     </p:extLst>
   </p:cSld>
@@ -5930,7 +6037,7 @@
                   </a:schemeClr>
                 </a:solidFill>
               </a:rPr>
-              <a:t>A Real Solution to a Real Problem</a:t>
+              <a:t>It Started with a Dream…</a:t>
             </a:r>
             <a:endParaRPr lang="en-US" sz="4800" dirty="0">
               <a:solidFill>
@@ -5954,10 +6061,45 @@
         </p:nvSpPr>
         <p:spPr/>
         <p:txBody>
-          <a:bodyPr>
-            <a:normAutofit lnSpcReduction="10000"/>
-          </a:bodyPr>
+          <a:bodyPr/>
           <a:lstStyle/>
+          <a:p>
+            <a:pPr marL="0" indent="0">
+              <a:lnSpc>
+                <a:spcPct val="100000"/>
+              </a:lnSpc>
+              <a:buNone/>
+              <a:defRPr/>
+            </a:pPr>
+            <a:r>
+              <a:rPr lang="en-US" dirty="0" smtClean="0"/>
+              <a:t>Many of our reports are </a:t>
+            </a:r>
+            <a:r>
+              <a:rPr lang="en-US" dirty="0" smtClean="0"/>
+              <a:t>just </a:t>
+            </a:r>
+            <a:r>
+              <a:rPr lang="en-US" dirty="0" smtClean="0"/>
+              <a:t>an SQL query with enough wiring to deliver the output to our users.</a:t>
+            </a:r>
+            <a:endParaRPr lang="en-US" dirty="0"/>
+          </a:p>
+          <a:p>
+            <a:pPr marL="377291" lvl="3" indent="-198935">
+              <a:lnSpc>
+                <a:spcPct val="100000"/>
+              </a:lnSpc>
+              <a:spcBef>
+                <a:spcPts val="173"/>
+              </a:spcBef>
+              <a:buSzPct val="80000"/>
+              <a:buFont typeface="Wingdings 2"/>
+              <a:buChar char=""/>
+              <a:defRPr/>
+            </a:pPr>
+            <a:endParaRPr lang="en-US" sz="1500" dirty="0"/>
+          </a:p>
           <a:p>
             <a:pPr marL="198935" indent="-198935">
               <a:lnSpc>
@@ -5968,12 +6110,16 @@
               <a:defRPr/>
             </a:pPr>
             <a:r>
+              <a:rPr lang="en-US" dirty="0"/>
+              <a:t>What if we could drop our query into a container that will collect the parameters from our users and </a:t>
+            </a:r>
+            <a:r>
               <a:rPr lang="en-US" dirty="0" smtClean="0"/>
-              <a:t>Oracle Reports is Going Away.</a:t>
-            </a:r>
-          </a:p>
-          <a:p>
-            <a:pPr marL="491543" lvl="1" indent="-198935">
+              <a:t>return the formatted output to them?</a:t>
+            </a:r>
+          </a:p>
+          <a:p>
+            <a:pPr marL="198935" indent="-198935">
               <a:lnSpc>
                 <a:spcPct val="100000"/>
               </a:lnSpc>
@@ -5981,108 +6127,22 @@
               <a:buChar char=""/>
               <a:defRPr/>
             </a:pPr>
-            <a:endParaRPr lang="en-US" dirty="0" smtClean="0"/>
-          </a:p>
-          <a:p>
-            <a:pPr marL="491543" lvl="1" indent="-198935">
+            <a:r>
+              <a:rPr lang="en-US" dirty="0" smtClean="0"/>
+              <a:t>What if we could use a simple DSL (Domain-specific language) to define the reports that are more complicated than one can do comfortably with a single select statement?</a:t>
+            </a:r>
+          </a:p>
+          <a:p>
+            <a:pPr marL="0" indent="0">
               <a:lnSpc>
                 <a:spcPct val="100000"/>
               </a:lnSpc>
-              <a:buFont typeface="Wingdings 2"/>
-              <a:buChar char=""/>
+              <a:buNone/>
               <a:defRPr/>
             </a:pPr>
             <a:r>
               <a:rPr lang="en-US" dirty="0" smtClean="0"/>
-              <a:t>We’ve </a:t>
-            </a:r>
-            <a:r>
-              <a:rPr lang="en-US" dirty="0"/>
-              <a:t>used Oracle Reports as our primary reporting tool since we started using Oracle, almost 25 years ago</a:t>
-            </a:r>
-            <a:r>
-              <a:rPr lang="en-US" dirty="0" smtClean="0"/>
-              <a:t>.</a:t>
-            </a:r>
-          </a:p>
-          <a:p>
-            <a:pPr marL="491543" lvl="1" indent="-198935">
-              <a:lnSpc>
-                <a:spcPct val="100000"/>
-              </a:lnSpc>
-              <a:buFont typeface="Wingdings 2"/>
-              <a:buChar char=""/>
-              <a:defRPr/>
-            </a:pPr>
-            <a:endParaRPr lang="en-US" dirty="0"/>
-          </a:p>
-          <a:p>
-            <a:pPr marL="491543" lvl="1" indent="-198935">
-              <a:lnSpc>
-                <a:spcPct val="100000"/>
-              </a:lnSpc>
-              <a:buFont typeface="Wingdings 2"/>
-              <a:buChar char=""/>
-              <a:defRPr/>
-            </a:pPr>
-            <a:r>
-              <a:rPr lang="en-US" dirty="0"/>
-              <a:t>We created over 600 Oracle Reports applications in the 15 years we’ve been using Banner</a:t>
-            </a:r>
-          </a:p>
-          <a:p>
-            <a:pPr marL="491543" lvl="1" indent="-198935">
-              <a:lnSpc>
-                <a:spcPct val="100000"/>
-              </a:lnSpc>
-              <a:buFont typeface="Wingdings 2"/>
-              <a:buChar char=""/>
-              <a:defRPr/>
-            </a:pPr>
-            <a:endParaRPr lang="en-US" dirty="0" smtClean="0"/>
-          </a:p>
-          <a:p>
-            <a:pPr marL="491543" lvl="1" indent="-198935">
-              <a:lnSpc>
-                <a:spcPct val="100000"/>
-              </a:lnSpc>
-              <a:buFont typeface="Wingdings 2"/>
-              <a:buChar char=""/>
-              <a:defRPr/>
-            </a:pPr>
-            <a:r>
-              <a:rPr lang="en-US" dirty="0" smtClean="0"/>
-              <a:t>Oracle has been giving gentle hints for some time that we shoul</a:t>
-            </a:r>
-            <a:r>
-              <a:rPr lang="en-US" dirty="0" smtClean="0"/>
-              <a:t>d move on to another tool.</a:t>
-            </a:r>
-            <a:endParaRPr lang="en-US" dirty="0" smtClean="0"/>
-          </a:p>
-          <a:p>
-            <a:pPr marL="491543" lvl="1" indent="-198935">
-              <a:lnSpc>
-                <a:spcPct val="100000"/>
-              </a:lnSpc>
-              <a:buFont typeface="Wingdings 2"/>
-              <a:buChar char=""/>
-              <a:defRPr/>
-            </a:pPr>
-            <a:endParaRPr lang="en-US" dirty="0" smtClean="0"/>
-          </a:p>
-          <a:p>
-            <a:pPr marL="491543" lvl="1" indent="-198935">
-              <a:lnSpc>
-                <a:spcPct val="100000"/>
-              </a:lnSpc>
-              <a:buFont typeface="Wingdings 2"/>
-              <a:buChar char=""/>
-              <a:defRPr/>
-            </a:pPr>
-            <a:r>
-              <a:rPr lang="en-US" dirty="0" smtClean="0"/>
-              <a:t>It never did a good job of producing data extracts, which many of our users prefer to a printed report these days.</a:t>
+              <a:t>Groovy gives us what we need to make this dream a reality.</a:t>
             </a:r>
             <a:endParaRPr lang="en-US" dirty="0"/>
           </a:p>
@@ -6258,7 +6318,7 @@
     </p:spTree>
     <p:extLst>
       <p:ext uri="{BB962C8B-B14F-4D97-AF65-F5344CB8AC3E}">
-        <p14:creationId xmlns:p14="http://schemas.microsoft.com/office/powerpoint/2010/main" val="3896415091"/>
+        <p14:creationId xmlns:p14="http://schemas.microsoft.com/office/powerpoint/2010/main" val="4136343241"/>
       </p:ext>
     </p:extLst>
   </p:cSld>
@@ -6329,7 +6389,7 @@
                   </a:schemeClr>
                 </a:solidFill>
               </a:rPr>
-              <a:t>It Started with a Dream…</a:t>
+              <a:t>What is Groovy?</a:t>
             </a:r>
             <a:endParaRPr lang="en-US" sz="4800" dirty="0">
               <a:solidFill>
@@ -6365,9 +6425,14 @@
               <a:defRPr/>
             </a:pPr>
             <a:r>
-              <a:rPr lang="en-US" dirty="0"/>
-              <a:t>Presentation Text</a:t>
-            </a:r>
+              <a:rPr lang="en-US" dirty="0" smtClean="0"/>
+              <a:t>Java-Based </a:t>
+            </a:r>
+            <a:r>
+              <a:rPr lang="en-US" smtClean="0"/>
+              <a:t>dynamic language</a:t>
+            </a:r>
+            <a:endParaRPr lang="en-US" dirty="0"/>
           </a:p>
           <a:p>
             <a:pPr marL="377291" lvl="3" indent="-198935">
@@ -6591,7 +6656,7 @@
     </p:spTree>
     <p:extLst>
       <p:ext uri="{BB962C8B-B14F-4D97-AF65-F5344CB8AC3E}">
-        <p14:creationId xmlns:p14="http://schemas.microsoft.com/office/powerpoint/2010/main" val="4136343241"/>
+        <p14:creationId xmlns:p14="http://schemas.microsoft.com/office/powerpoint/2010/main" val="2478160142"/>
       </p:ext>
     </p:extLst>
   </p:cSld>

</xml_diff>